<commit_message>
[UPDATE] Taller 1, y PPTX
</commit_message>
<xml_diff>
--- a/Material/Taller_UTP.pptx
+++ b/Material/Taller_UTP.pptx
@@ -136,360 +136,6 @@
 </p1510:revInfo>
 </file>
 
-<file path=ppt/changesInfos/changesInfo1.xml><?xml version="1.0" encoding="utf-8"?>
-<pc:chgInfo xmlns:a="http://schemas.openxmlformats.org/drawingml/2006/main" xmlns:r="http://schemas.openxmlformats.org/officeDocument/2006/relationships" xmlns:ac="http://schemas.microsoft.com/office/drawing/2013/main/command" xmlns:pc="http://schemas.microsoft.com/office/powerpoint/2013/main/command">
-  <pc:docChgLst>
-    <pc:chgData name="Ricardo Lasso" userId="c07152a7-d915-4475-8057-7530dce965fb" providerId="ADAL" clId="{EE4E49F7-9512-D040-B4F7-F9A19F75B344}"/>
-    <pc:docChg chg="undo custSel addSld delSld modSld sldOrd">
-      <pc:chgData name="Ricardo Lasso" userId="c07152a7-d915-4475-8057-7530dce965fb" providerId="ADAL" clId="{EE4E49F7-9512-D040-B4F7-F9A19F75B344}" dt="2025-08-11T17:00:44.796" v="1162" actId="1076"/>
-      <pc:docMkLst>
-        <pc:docMk/>
-      </pc:docMkLst>
-      <pc:sldChg chg="addSp delSp modSp mod modNotesTx">
-        <pc:chgData name="Ricardo Lasso" userId="c07152a7-d915-4475-8057-7530dce965fb" providerId="ADAL" clId="{EE4E49F7-9512-D040-B4F7-F9A19F75B344}" dt="2025-08-11T16:04:42.767" v="72" actId="20577"/>
-        <pc:sldMkLst>
-          <pc:docMk/>
-          <pc:sldMk cId="3733260076" sldId="2147470072"/>
-        </pc:sldMkLst>
-        <pc:spChg chg="del mod">
-          <ac:chgData name="Ricardo Lasso" userId="c07152a7-d915-4475-8057-7530dce965fb" providerId="ADAL" clId="{EE4E49F7-9512-D040-B4F7-F9A19F75B344}" dt="2025-08-11T15:57:22.873" v="34" actId="478"/>
-          <ac:spMkLst>
-            <pc:docMk/>
-            <pc:sldMk cId="3733260076" sldId="2147470072"/>
-            <ac:spMk id="3" creationId="{06D72E15-4696-2DE0-0AAD-BE82CC9350AE}"/>
-          </ac:spMkLst>
-        </pc:spChg>
-        <pc:spChg chg="add mod">
-          <ac:chgData name="Ricardo Lasso" userId="c07152a7-d915-4475-8057-7530dce965fb" providerId="ADAL" clId="{EE4E49F7-9512-D040-B4F7-F9A19F75B344}" dt="2025-08-11T16:04:42.767" v="72" actId="20577"/>
-          <ac:spMkLst>
-            <pc:docMk/>
-            <pc:sldMk cId="3733260076" sldId="2147470072"/>
-            <ac:spMk id="4" creationId="{A2B9F49F-B84A-0E89-ADC3-9106F129F295}"/>
-          </ac:spMkLst>
-        </pc:spChg>
-        <pc:picChg chg="add del mod">
-          <ac:chgData name="Ricardo Lasso" userId="c07152a7-d915-4475-8057-7530dce965fb" providerId="ADAL" clId="{EE4E49F7-9512-D040-B4F7-F9A19F75B344}" dt="2025-08-11T16:00:23.881" v="36" actId="478"/>
-          <ac:picMkLst>
-            <pc:docMk/>
-            <pc:sldMk cId="3733260076" sldId="2147470072"/>
-            <ac:picMk id="1026" creationId="{353A83CD-AFE3-B36F-0E5E-BEB3A0506EE9}"/>
-          </ac:picMkLst>
-        </pc:picChg>
-        <pc:picChg chg="add mod">
-          <ac:chgData name="Ricardo Lasso" userId="c07152a7-d915-4475-8057-7530dce965fb" providerId="ADAL" clId="{EE4E49F7-9512-D040-B4F7-F9A19F75B344}" dt="2025-08-11T16:02:38.131" v="40" actId="732"/>
-          <ac:picMkLst>
-            <pc:docMk/>
-            <pc:sldMk cId="3733260076" sldId="2147470072"/>
-            <ac:picMk id="1028" creationId="{D8B1E7C3-9F61-82C6-47DD-47C432F893F6}"/>
-          </ac:picMkLst>
-        </pc:picChg>
-        <pc:picChg chg="add mod">
-          <ac:chgData name="Ricardo Lasso" userId="c07152a7-d915-4475-8057-7530dce965fb" providerId="ADAL" clId="{EE4E49F7-9512-D040-B4F7-F9A19F75B344}" dt="2025-08-11T16:03:39.024" v="50" actId="732"/>
-          <ac:picMkLst>
-            <pc:docMk/>
-            <pc:sldMk cId="3733260076" sldId="2147470072"/>
-            <ac:picMk id="1030" creationId="{2D7E23DD-203F-1554-16CB-CC943BF51876}"/>
-          </ac:picMkLst>
-        </pc:picChg>
-      </pc:sldChg>
-      <pc:sldChg chg="addSp delSp modSp mod ord modNotesTx">
-        <pc:chgData name="Ricardo Lasso" userId="c07152a7-d915-4475-8057-7530dce965fb" providerId="ADAL" clId="{EE4E49F7-9512-D040-B4F7-F9A19F75B344}" dt="2025-08-11T16:50:31.642" v="922" actId="27636"/>
-        <pc:sldMkLst>
-          <pc:docMk/>
-          <pc:sldMk cId="3278267858" sldId="2147470073"/>
-        </pc:sldMkLst>
-        <pc:spChg chg="mod">
-          <ac:chgData name="Ricardo Lasso" userId="c07152a7-d915-4475-8057-7530dce965fb" providerId="ADAL" clId="{EE4E49F7-9512-D040-B4F7-F9A19F75B344}" dt="2025-08-11T16:50:31.642" v="922" actId="27636"/>
-          <ac:spMkLst>
-            <pc:docMk/>
-            <pc:sldMk cId="3278267858" sldId="2147470073"/>
-            <ac:spMk id="2" creationId="{2EC66B10-3154-5325-B745-96BF92FE59A6}"/>
-          </ac:spMkLst>
-        </pc:spChg>
-        <pc:spChg chg="mod">
-          <ac:chgData name="Ricardo Lasso" userId="c07152a7-d915-4475-8057-7530dce965fb" providerId="ADAL" clId="{EE4E49F7-9512-D040-B4F7-F9A19F75B344}" dt="2025-08-11T16:36:21.779" v="617" actId="20577"/>
-          <ac:spMkLst>
-            <pc:docMk/>
-            <pc:sldMk cId="3278267858" sldId="2147470073"/>
-            <ac:spMk id="3" creationId="{88045174-60F5-7D04-A423-21E42F43023C}"/>
-          </ac:spMkLst>
-        </pc:spChg>
-        <pc:picChg chg="add del mod">
-          <ac:chgData name="Ricardo Lasso" userId="c07152a7-d915-4475-8057-7530dce965fb" providerId="ADAL" clId="{EE4E49F7-9512-D040-B4F7-F9A19F75B344}" dt="2025-08-11T16:13:20.796" v="211" actId="478"/>
-          <ac:picMkLst>
-            <pc:docMk/>
-            <pc:sldMk cId="3278267858" sldId="2147470073"/>
-            <ac:picMk id="2050" creationId="{DD12638C-CFFF-F10F-7B27-F2D2D673242B}"/>
-          </ac:picMkLst>
-        </pc:picChg>
-        <pc:picChg chg="add del mod">
-          <ac:chgData name="Ricardo Lasso" userId="c07152a7-d915-4475-8057-7530dce965fb" providerId="ADAL" clId="{EE4E49F7-9512-D040-B4F7-F9A19F75B344}" dt="2025-08-11T16:46:03.268" v="772" actId="478"/>
-          <ac:picMkLst>
-            <pc:docMk/>
-            <pc:sldMk cId="3278267858" sldId="2147470073"/>
-            <ac:picMk id="2052" creationId="{502C6410-B357-B950-9A70-107828DC7C66}"/>
-          </ac:picMkLst>
-        </pc:picChg>
-        <pc:picChg chg="add del">
-          <ac:chgData name="Ricardo Lasso" userId="c07152a7-d915-4475-8057-7530dce965fb" providerId="ADAL" clId="{EE4E49F7-9512-D040-B4F7-F9A19F75B344}" dt="2025-08-11T16:46:03.268" v="772" actId="478"/>
-          <ac:picMkLst>
-            <pc:docMk/>
-            <pc:sldMk cId="3278267858" sldId="2147470073"/>
-            <ac:picMk id="2054" creationId="{637E9168-586C-91E6-1487-DC71C89F98CB}"/>
-          </ac:picMkLst>
-        </pc:picChg>
-        <pc:picChg chg="add mod">
-          <ac:chgData name="Ricardo Lasso" userId="c07152a7-d915-4475-8057-7530dce965fb" providerId="ADAL" clId="{EE4E49F7-9512-D040-B4F7-F9A19F75B344}" dt="2025-08-11T16:46:10.933" v="775" actId="1076"/>
-          <ac:picMkLst>
-            <pc:docMk/>
-            <pc:sldMk cId="3278267858" sldId="2147470073"/>
-            <ac:picMk id="2056" creationId="{D0271D56-0F89-6E90-3A34-7C659143F82E}"/>
-          </ac:picMkLst>
-        </pc:picChg>
-      </pc:sldChg>
-      <pc:sldChg chg="addSp modSp mod">
-        <pc:chgData name="Ricardo Lasso" userId="c07152a7-d915-4475-8057-7530dce965fb" providerId="ADAL" clId="{EE4E49F7-9512-D040-B4F7-F9A19F75B344}" dt="2025-08-11T16:20:06.392" v="270" actId="1076"/>
-        <pc:sldMkLst>
-          <pc:docMk/>
-          <pc:sldMk cId="1114161957" sldId="2147470074"/>
-        </pc:sldMkLst>
-        <pc:spChg chg="mod">
-          <ac:chgData name="Ricardo Lasso" userId="c07152a7-d915-4475-8057-7530dce965fb" providerId="ADAL" clId="{EE4E49F7-9512-D040-B4F7-F9A19F75B344}" dt="2025-08-11T16:19:36.300" v="267" actId="1076"/>
-          <ac:spMkLst>
-            <pc:docMk/>
-            <pc:sldMk cId="1114161957" sldId="2147470074"/>
-            <ac:spMk id="3" creationId="{FBD8E8BC-AE8F-BB99-3C7D-400FF2F74898}"/>
-          </ac:spMkLst>
-        </pc:spChg>
-        <pc:picChg chg="add mod">
-          <ac:chgData name="Ricardo Lasso" userId="c07152a7-d915-4475-8057-7530dce965fb" providerId="ADAL" clId="{EE4E49F7-9512-D040-B4F7-F9A19F75B344}" dt="2025-08-11T16:20:06.392" v="270" actId="1076"/>
-          <ac:picMkLst>
-            <pc:docMk/>
-            <pc:sldMk cId="1114161957" sldId="2147470074"/>
-            <ac:picMk id="3074" creationId="{FE81EF90-0767-4676-973F-536D17C02ED3}"/>
-          </ac:picMkLst>
-        </pc:picChg>
-      </pc:sldChg>
-      <pc:sldChg chg="addSp delSp modSp mod modNotesTx">
-        <pc:chgData name="Ricardo Lasso" userId="c07152a7-d915-4475-8057-7530dce965fb" providerId="ADAL" clId="{EE4E49F7-9512-D040-B4F7-F9A19F75B344}" dt="2025-08-11T16:51:31.878" v="928" actId="767"/>
-        <pc:sldMkLst>
-          <pc:docMk/>
-          <pc:sldMk cId="3918149205" sldId="2147470075"/>
-        </pc:sldMkLst>
-        <pc:spChg chg="del mod">
-          <ac:chgData name="Ricardo Lasso" userId="c07152a7-d915-4475-8057-7530dce965fb" providerId="ADAL" clId="{EE4E49F7-9512-D040-B4F7-F9A19F75B344}" dt="2025-08-11T16:32:07.564" v="542" actId="478"/>
-          <ac:spMkLst>
-            <pc:docMk/>
-            <pc:sldMk cId="3918149205" sldId="2147470075"/>
-            <ac:spMk id="3" creationId="{C99A1F11-D8A7-7DE1-C17B-A1F099A030BC}"/>
-          </ac:spMkLst>
-        </pc:spChg>
-        <pc:spChg chg="add mod">
-          <ac:chgData name="Ricardo Lasso" userId="c07152a7-d915-4475-8057-7530dce965fb" providerId="ADAL" clId="{EE4E49F7-9512-D040-B4F7-F9A19F75B344}" dt="2025-08-11T16:51:31.878" v="928" actId="767"/>
-          <ac:spMkLst>
-            <pc:docMk/>
-            <pc:sldMk cId="3918149205" sldId="2147470075"/>
-            <ac:spMk id="4" creationId="{E2A9E2E7-5127-09F4-3BD7-D94BBFBDCDFE}"/>
-          </ac:spMkLst>
-        </pc:spChg>
-        <pc:picChg chg="add mod">
-          <ac:chgData name="Ricardo Lasso" userId="c07152a7-d915-4475-8057-7530dce965fb" providerId="ADAL" clId="{EE4E49F7-9512-D040-B4F7-F9A19F75B344}" dt="2025-08-11T16:32:21.884" v="545" actId="1076"/>
-          <ac:picMkLst>
-            <pc:docMk/>
-            <pc:sldMk cId="3918149205" sldId="2147470075"/>
-            <ac:picMk id="5122" creationId="{A7278FFF-9568-919A-57A7-94881B811494}"/>
-          </ac:picMkLst>
-        </pc:picChg>
-      </pc:sldChg>
-      <pc:sldChg chg="modSp mod">
-        <pc:chgData name="Ricardo Lasso" userId="c07152a7-d915-4475-8057-7530dce965fb" providerId="ADAL" clId="{EE4E49F7-9512-D040-B4F7-F9A19F75B344}" dt="2025-08-11T16:53:20.944" v="1101" actId="20577"/>
-        <pc:sldMkLst>
-          <pc:docMk/>
-          <pc:sldMk cId="1936351289" sldId="2147470076"/>
-        </pc:sldMkLst>
-        <pc:spChg chg="mod">
-          <ac:chgData name="Ricardo Lasso" userId="c07152a7-d915-4475-8057-7530dce965fb" providerId="ADAL" clId="{EE4E49F7-9512-D040-B4F7-F9A19F75B344}" dt="2025-08-11T16:53:20.944" v="1101" actId="20577"/>
-          <ac:spMkLst>
-            <pc:docMk/>
-            <pc:sldMk cId="1936351289" sldId="2147470076"/>
-            <ac:spMk id="3" creationId="{A36989EB-8A47-7E69-9227-9316A3A5E961}"/>
-          </ac:spMkLst>
-        </pc:spChg>
-      </pc:sldChg>
-      <pc:sldChg chg="addSp modSp new mod">
-        <pc:chgData name="Ricardo Lasso" userId="c07152a7-d915-4475-8057-7530dce965fb" providerId="ADAL" clId="{EE4E49F7-9512-D040-B4F7-F9A19F75B344}" dt="2025-08-11T16:24:51.313" v="483" actId="1076"/>
-        <pc:sldMkLst>
-          <pc:docMk/>
-          <pc:sldMk cId="1915553272" sldId="2147470077"/>
-        </pc:sldMkLst>
-        <pc:spChg chg="mod">
-          <ac:chgData name="Ricardo Lasso" userId="c07152a7-d915-4475-8057-7530dce965fb" providerId="ADAL" clId="{EE4E49F7-9512-D040-B4F7-F9A19F75B344}" dt="2025-08-11T16:20:39.223" v="285" actId="20577"/>
-          <ac:spMkLst>
-            <pc:docMk/>
-            <pc:sldMk cId="1915553272" sldId="2147470077"/>
-            <ac:spMk id="2" creationId="{7C4224CA-B29D-10B2-5A7D-3C53F7D7FB37}"/>
-          </ac:spMkLst>
-        </pc:spChg>
-        <pc:spChg chg="mod">
-          <ac:chgData name="Ricardo Lasso" userId="c07152a7-d915-4475-8057-7530dce965fb" providerId="ADAL" clId="{EE4E49F7-9512-D040-B4F7-F9A19F75B344}" dt="2025-08-11T16:24:51.313" v="483" actId="1076"/>
-          <ac:spMkLst>
-            <pc:docMk/>
-            <pc:sldMk cId="1915553272" sldId="2147470077"/>
-            <ac:spMk id="3" creationId="{83995FD8-862D-E110-175D-4A412F85CACE}"/>
-          </ac:spMkLst>
-        </pc:spChg>
-        <pc:picChg chg="add mod">
-          <ac:chgData name="Ricardo Lasso" userId="c07152a7-d915-4475-8057-7530dce965fb" providerId="ADAL" clId="{EE4E49F7-9512-D040-B4F7-F9A19F75B344}" dt="2025-08-11T16:24:47.552" v="482" actId="1076"/>
-          <ac:picMkLst>
-            <pc:docMk/>
-            <pc:sldMk cId="1915553272" sldId="2147470077"/>
-            <ac:picMk id="4098" creationId="{CE2C5FB3-6571-4AB8-5891-2B5BA8EF4834}"/>
-          </ac:picMkLst>
-        </pc:picChg>
-      </pc:sldChg>
-      <pc:sldChg chg="new del">
-        <pc:chgData name="Ricardo Lasso" userId="c07152a7-d915-4475-8057-7530dce965fb" providerId="ADAL" clId="{EE4E49F7-9512-D040-B4F7-F9A19F75B344}" dt="2025-08-11T16:25:52.364" v="485" actId="2696"/>
-        <pc:sldMkLst>
-          <pc:docMk/>
-          <pc:sldMk cId="2297142503" sldId="2147470078"/>
-        </pc:sldMkLst>
-      </pc:sldChg>
-      <pc:sldChg chg="addSp modSp new mod">
-        <pc:chgData name="Ricardo Lasso" userId="c07152a7-d915-4475-8057-7530dce965fb" providerId="ADAL" clId="{EE4E49F7-9512-D040-B4F7-F9A19F75B344}" dt="2025-08-11T16:35:20.464" v="616" actId="1076"/>
-        <pc:sldMkLst>
-          <pc:docMk/>
-          <pc:sldMk cId="3820727425" sldId="2147470078"/>
-        </pc:sldMkLst>
-        <pc:spChg chg="mod">
-          <ac:chgData name="Ricardo Lasso" userId="c07152a7-d915-4475-8057-7530dce965fb" providerId="ADAL" clId="{EE4E49F7-9512-D040-B4F7-F9A19F75B344}" dt="2025-08-11T16:33:32.645" v="589" actId="20577"/>
-          <ac:spMkLst>
-            <pc:docMk/>
-            <pc:sldMk cId="3820727425" sldId="2147470078"/>
-            <ac:spMk id="2" creationId="{AAE949E4-021D-8456-46FC-155E6FF1C421}"/>
-          </ac:spMkLst>
-        </pc:spChg>
-        <pc:spChg chg="mod">
-          <ac:chgData name="Ricardo Lasso" userId="c07152a7-d915-4475-8057-7530dce965fb" providerId="ADAL" clId="{EE4E49F7-9512-D040-B4F7-F9A19F75B344}" dt="2025-08-11T16:34:39.358" v="610" actId="403"/>
-          <ac:spMkLst>
-            <pc:docMk/>
-            <pc:sldMk cId="3820727425" sldId="2147470078"/>
-            <ac:spMk id="3" creationId="{623B391C-15F9-FCD6-01AC-59F0CBC1A2D9}"/>
-          </ac:spMkLst>
-        </pc:spChg>
-        <pc:picChg chg="add mod">
-          <ac:chgData name="Ricardo Lasso" userId="c07152a7-d915-4475-8057-7530dce965fb" providerId="ADAL" clId="{EE4E49F7-9512-D040-B4F7-F9A19F75B344}" dt="2025-08-11T16:35:20.464" v="616" actId="1076"/>
-          <ac:picMkLst>
-            <pc:docMk/>
-            <pc:sldMk cId="3820727425" sldId="2147470078"/>
-            <ac:picMk id="6146" creationId="{59A3B1B4-32A0-38DF-2282-31766196DF35}"/>
-          </ac:picMkLst>
-        </pc:picChg>
-      </pc:sldChg>
-      <pc:sldChg chg="add del">
-        <pc:chgData name="Ricardo Lasso" userId="c07152a7-d915-4475-8057-7530dce965fb" providerId="ADAL" clId="{EE4E49F7-9512-D040-B4F7-F9A19F75B344}" dt="2025-08-11T16:36:33.810" v="619" actId="2696"/>
-        <pc:sldMkLst>
-          <pc:docMk/>
-          <pc:sldMk cId="1523043609" sldId="2147470079"/>
-        </pc:sldMkLst>
-      </pc:sldChg>
-      <pc:sldChg chg="addSp modSp new mod ord">
-        <pc:chgData name="Ricardo Lasso" userId="c07152a7-d915-4475-8057-7530dce965fb" providerId="ADAL" clId="{EE4E49F7-9512-D040-B4F7-F9A19F75B344}" dt="2025-08-11T16:44:10.264" v="722" actId="20578"/>
-        <pc:sldMkLst>
-          <pc:docMk/>
-          <pc:sldMk cId="3451732229" sldId="2147470079"/>
-        </pc:sldMkLst>
-        <pc:spChg chg="mod">
-          <ac:chgData name="Ricardo Lasso" userId="c07152a7-d915-4475-8057-7530dce965fb" providerId="ADAL" clId="{EE4E49F7-9512-D040-B4F7-F9A19F75B344}" dt="2025-08-11T16:36:55.363" v="621"/>
-          <ac:spMkLst>
-            <pc:docMk/>
-            <pc:sldMk cId="3451732229" sldId="2147470079"/>
-            <ac:spMk id="2" creationId="{79BD3D9D-D589-7ADA-D548-D26C22D68AF2}"/>
-          </ac:spMkLst>
-        </pc:spChg>
-        <pc:spChg chg="mod">
-          <ac:chgData name="Ricardo Lasso" userId="c07152a7-d915-4475-8057-7530dce965fb" providerId="ADAL" clId="{EE4E49F7-9512-D040-B4F7-F9A19F75B344}" dt="2025-08-11T16:40:16.564" v="718" actId="20577"/>
-          <ac:spMkLst>
-            <pc:docMk/>
-            <pc:sldMk cId="3451732229" sldId="2147470079"/>
-            <ac:spMk id="3" creationId="{05C5B575-C824-81D4-F434-43AC2E2F903C}"/>
-          </ac:spMkLst>
-        </pc:spChg>
-        <pc:picChg chg="add mod">
-          <ac:chgData name="Ricardo Lasso" userId="c07152a7-d915-4475-8057-7530dce965fb" providerId="ADAL" clId="{EE4E49F7-9512-D040-B4F7-F9A19F75B344}" dt="2025-08-11T16:41:36.633" v="721" actId="1076"/>
-          <ac:picMkLst>
-            <pc:docMk/>
-            <pc:sldMk cId="3451732229" sldId="2147470079"/>
-            <ac:picMk id="8194" creationId="{A5FAC838-2FB9-2AFB-4DEC-744818C79D17}"/>
-          </ac:picMkLst>
-        </pc:picChg>
-      </pc:sldChg>
-      <pc:sldChg chg="modSp add mod modNotesTx">
-        <pc:chgData name="Ricardo Lasso" userId="c07152a7-d915-4475-8057-7530dce965fb" providerId="ADAL" clId="{EE4E49F7-9512-D040-B4F7-F9A19F75B344}" dt="2025-08-11T16:50:25.674" v="920" actId="20577"/>
-        <pc:sldMkLst>
-          <pc:docMk/>
-          <pc:sldMk cId="4277257245" sldId="2147470080"/>
-        </pc:sldMkLst>
-        <pc:spChg chg="mod">
-          <ac:chgData name="Ricardo Lasso" userId="c07152a7-d915-4475-8057-7530dce965fb" providerId="ADAL" clId="{EE4E49F7-9512-D040-B4F7-F9A19F75B344}" dt="2025-08-11T16:50:25.674" v="920" actId="20577"/>
-          <ac:spMkLst>
-            <pc:docMk/>
-            <pc:sldMk cId="4277257245" sldId="2147470080"/>
-            <ac:spMk id="2" creationId="{502A15FE-8D51-9998-F72D-EC976F30FDAA}"/>
-          </ac:spMkLst>
-        </pc:spChg>
-        <pc:spChg chg="mod">
-          <ac:chgData name="Ricardo Lasso" userId="c07152a7-d915-4475-8057-7530dce965fb" providerId="ADAL" clId="{EE4E49F7-9512-D040-B4F7-F9A19F75B344}" dt="2025-08-11T16:48:29.313" v="847" actId="20577"/>
-          <ac:spMkLst>
-            <pc:docMk/>
-            <pc:sldMk cId="4277257245" sldId="2147470080"/>
-            <ac:spMk id="3" creationId="{8FF3229C-BC63-49C1-608A-31D1D80EC3BD}"/>
-          </ac:spMkLst>
-        </pc:spChg>
-        <pc:picChg chg="mod">
-          <ac:chgData name="Ricardo Lasso" userId="c07152a7-d915-4475-8057-7530dce965fb" providerId="ADAL" clId="{EE4E49F7-9512-D040-B4F7-F9A19F75B344}" dt="2025-08-11T16:46:50.047" v="815" actId="1076"/>
-          <ac:picMkLst>
-            <pc:docMk/>
-            <pc:sldMk cId="4277257245" sldId="2147470080"/>
-            <ac:picMk id="2052" creationId="{1CC22CCC-BAF2-9306-0A4E-82C9DF0FE339}"/>
-          </ac:picMkLst>
-        </pc:picChg>
-      </pc:sldChg>
-      <pc:sldChg chg="addSp modSp new mod modAnim">
-        <pc:chgData name="Ricardo Lasso" userId="c07152a7-d915-4475-8057-7530dce965fb" providerId="ADAL" clId="{EE4E49F7-9512-D040-B4F7-F9A19F75B344}" dt="2025-08-11T17:00:44.796" v="1162" actId="1076"/>
-        <pc:sldMkLst>
-          <pc:docMk/>
-          <pc:sldMk cId="3411096461" sldId="2147470081"/>
-        </pc:sldMkLst>
-        <pc:spChg chg="mod">
-          <ac:chgData name="Ricardo Lasso" userId="c07152a7-d915-4475-8057-7530dce965fb" providerId="ADAL" clId="{EE4E49F7-9512-D040-B4F7-F9A19F75B344}" dt="2025-08-11T16:59:45.438" v="1144" actId="20577"/>
-          <ac:spMkLst>
-            <pc:docMk/>
-            <pc:sldMk cId="3411096461" sldId="2147470081"/>
-            <ac:spMk id="2" creationId="{3BEA0203-BCD2-2E91-4B41-AC48DB725B4A}"/>
-          </ac:spMkLst>
-        </pc:spChg>
-        <pc:spChg chg="mod">
-          <ac:chgData name="Ricardo Lasso" userId="c07152a7-d915-4475-8057-7530dce965fb" providerId="ADAL" clId="{EE4E49F7-9512-D040-B4F7-F9A19F75B344}" dt="2025-08-11T17:00:34.114" v="1158" actId="1076"/>
-          <ac:spMkLst>
-            <pc:docMk/>
-            <pc:sldMk cId="3411096461" sldId="2147470081"/>
-            <ac:spMk id="3" creationId="{DE5125A3-F7E1-3E51-6F5B-C9F7C09DA69E}"/>
-          </ac:spMkLst>
-        </pc:spChg>
-        <pc:picChg chg="add mod">
-          <ac:chgData name="Ricardo Lasso" userId="c07152a7-d915-4475-8057-7530dce965fb" providerId="ADAL" clId="{EE4E49F7-9512-D040-B4F7-F9A19F75B344}" dt="2025-08-11T17:00:44.796" v="1162" actId="1076"/>
-          <ac:picMkLst>
-            <pc:docMk/>
-            <pc:sldMk cId="3411096461" sldId="2147470081"/>
-            <ac:picMk id="4" creationId="{B1011E2F-0FCC-53F9-1953-03CA2A7995C6}"/>
-          </ac:picMkLst>
-        </pc:picChg>
-      </pc:sldChg>
-    </pc:docChg>
-  </pc:docChgLst>
-</pc:chgInfo>
-</file>
-
 <file path=ppt/notesMasters/notesMaster1.xml><?xml version="1.0" encoding="utf-8"?>
 <p:notesMaster xmlns:a="http://schemas.openxmlformats.org/drawingml/2006/main" xmlns:r="http://schemas.openxmlformats.org/officeDocument/2006/relationships" xmlns:p="http://schemas.openxmlformats.org/presentationml/2006/main">
   <p:cSld>
@@ -572,7 +218,7 @@
           <a:p>
             <a:fld id="{25D9A60E-AC15-594D-8F31-10A3E7DD6026}" type="datetimeFigureOut">
               <a:rPr lang="es-PA" smtClean="0"/>
-              <a:t>08/11/25</a:t>
+              <a:t>08/25/25</a:t>
             </a:fld>
             <a:endParaRPr lang="es-PA"/>
           </a:p>
@@ -1582,7 +1228,7 @@
           <a:p>
             <a:fld id="{4F728597-7008-4D06-B173-3EE606CD6946}" type="datetimeFigureOut">
               <a:rPr lang="es-PA" smtClean="0"/>
-              <a:t>08/11/25</a:t>
+              <a:t>08/25/25</a:t>
             </a:fld>
             <a:endParaRPr lang="es-PA"/>
           </a:p>
@@ -1782,7 +1428,7 @@
           <a:p>
             <a:fld id="{4F728597-7008-4D06-B173-3EE606CD6946}" type="datetimeFigureOut">
               <a:rPr lang="es-PA" smtClean="0"/>
-              <a:t>08/11/25</a:t>
+              <a:t>08/25/25</a:t>
             </a:fld>
             <a:endParaRPr lang="es-PA"/>
           </a:p>
@@ -1992,7 +1638,7 @@
           <a:p>
             <a:fld id="{4F728597-7008-4D06-B173-3EE606CD6946}" type="datetimeFigureOut">
               <a:rPr lang="es-PA" smtClean="0"/>
-              <a:t>08/11/25</a:t>
+              <a:t>08/25/25</a:t>
             </a:fld>
             <a:endParaRPr lang="es-PA"/>
           </a:p>
@@ -3229,7 +2875,7 @@
           <a:p>
             <a:fld id="{4F728597-7008-4D06-B173-3EE606CD6946}" type="datetimeFigureOut">
               <a:rPr lang="es-PA" smtClean="0"/>
-              <a:t>08/11/25</a:t>
+              <a:t>08/25/25</a:t>
             </a:fld>
             <a:endParaRPr lang="es-PA"/>
           </a:p>
@@ -3505,7 +3151,7 @@
           <a:p>
             <a:fld id="{4F728597-7008-4D06-B173-3EE606CD6946}" type="datetimeFigureOut">
               <a:rPr lang="es-PA" smtClean="0"/>
-              <a:t>08/11/25</a:t>
+              <a:t>08/25/25</a:t>
             </a:fld>
             <a:endParaRPr lang="es-PA"/>
           </a:p>
@@ -3773,7 +3419,7 @@
           <a:p>
             <a:fld id="{4F728597-7008-4D06-B173-3EE606CD6946}" type="datetimeFigureOut">
               <a:rPr lang="es-PA" smtClean="0"/>
-              <a:t>08/11/25</a:t>
+              <a:t>08/25/25</a:t>
             </a:fld>
             <a:endParaRPr lang="es-PA"/>
           </a:p>
@@ -4188,7 +3834,7 @@
           <a:p>
             <a:fld id="{4F728597-7008-4D06-B173-3EE606CD6946}" type="datetimeFigureOut">
               <a:rPr lang="es-PA" smtClean="0"/>
-              <a:t>08/11/25</a:t>
+              <a:t>08/25/25</a:t>
             </a:fld>
             <a:endParaRPr lang="es-PA"/>
           </a:p>
@@ -4330,7 +3976,7 @@
           <a:p>
             <a:fld id="{4F728597-7008-4D06-B173-3EE606CD6946}" type="datetimeFigureOut">
               <a:rPr lang="es-PA" smtClean="0"/>
-              <a:t>08/11/25</a:t>
+              <a:t>08/25/25</a:t>
             </a:fld>
             <a:endParaRPr lang="es-PA"/>
           </a:p>
@@ -4443,7 +4089,7 @@
           <a:p>
             <a:fld id="{4F728597-7008-4D06-B173-3EE606CD6946}" type="datetimeFigureOut">
               <a:rPr lang="es-PA" smtClean="0"/>
-              <a:t>08/11/25</a:t>
+              <a:t>08/25/25</a:t>
             </a:fld>
             <a:endParaRPr lang="es-PA"/>
           </a:p>
@@ -4756,7 +4402,7 @@
           <a:p>
             <a:fld id="{4F728597-7008-4D06-B173-3EE606CD6946}" type="datetimeFigureOut">
               <a:rPr lang="es-PA" smtClean="0"/>
-              <a:t>08/11/25</a:t>
+              <a:t>08/25/25</a:t>
             </a:fld>
             <a:endParaRPr lang="es-PA"/>
           </a:p>
@@ -5045,7 +4691,7 @@
           <a:p>
             <a:fld id="{4F728597-7008-4D06-B173-3EE606CD6946}" type="datetimeFigureOut">
               <a:rPr lang="es-PA" smtClean="0"/>
-              <a:t>08/11/25</a:t>
+              <a:t>08/25/25</a:t>
             </a:fld>
             <a:endParaRPr lang="es-PA"/>
           </a:p>
@@ -5288,7 +4934,7 @@
           <a:p>
             <a:fld id="{4F728597-7008-4D06-B173-3EE606CD6946}" type="datetimeFigureOut">
               <a:rPr lang="es-PA" smtClean="0"/>
-              <a:t>08/11/25</a:t>
+              <a:t>08/25/25</a:t>
             </a:fld>
             <a:endParaRPr lang="es-PA"/>
           </a:p>
@@ -8133,6 +7779,53 @@
           <a:xfrm>
             <a:off x="8560804" y="3439387"/>
             <a:ext cx="2949879" cy="2949879"/>
+          </a:xfrm>
+          <a:prstGeom prst="rect">
+            <a:avLst/>
+          </a:prstGeom>
+          <a:noFill/>
+          <a:extLst>
+            <a:ext uri="{909E8E84-426E-40DD-AFC4-6F175D3DCCD1}">
+              <a14:hiddenFill xmlns:a14="http://schemas.microsoft.com/office/drawing/2010/main">
+                <a:solidFill>
+                  <a:srgbClr val="FFFFFF"/>
+                </a:solidFill>
+              </a14:hiddenFill>
+            </a:ext>
+          </a:extLst>
+        </p:spPr>
+      </p:pic>
+      <p:pic>
+        <p:nvPicPr>
+          <p:cNvPr id="1026" name="Picture 2" descr="Your First Step in Python: Writing a “Hello, World!” Program | by Abhinn  Pandey | Medium">
+            <a:extLst>
+              <a:ext uri="{FF2B5EF4-FFF2-40B4-BE49-F238E27FC236}">
+                <a16:creationId xmlns:a16="http://schemas.microsoft.com/office/drawing/2014/main" id="{02B330E3-EA7A-29DD-CB64-C90B74293DAD}"/>
+              </a:ext>
+            </a:extLst>
+          </p:cNvPr>
+          <p:cNvPicPr>
+            <a:picLocks noChangeAspect="1" noChangeArrowheads="1"/>
+          </p:cNvPicPr>
+          <p:nvPr/>
+        </p:nvPicPr>
+        <p:blipFill>
+          <a:blip r:embed="rId3">
+            <a:extLst>
+              <a:ext uri="{28A0092B-C50C-407E-A947-70E740481C1C}">
+                <a14:useLocalDpi xmlns:a14="http://schemas.microsoft.com/office/drawing/2010/main" val="0"/>
+              </a:ext>
+            </a:extLst>
+          </a:blip>
+          <a:srcRect/>
+          <a:stretch>
+            <a:fillRect/>
+          </a:stretch>
+        </p:blipFill>
+        <p:spPr bwMode="auto">
+          <a:xfrm>
+            <a:off x="847541" y="3940768"/>
+            <a:ext cx="4235240" cy="2448498"/>
           </a:xfrm>
           <a:prstGeom prst="rect">
             <a:avLst/>

</xml_diff>